<commit_message>
Updated diagram for tools/technologies for README.
</commit_message>
<xml_diff>
--- a/docs/NIEM-Metamodel.pptx
+++ b/docs/NIEM-Metamodel.pptx
@@ -4021,8 +4021,8 @@
         </p:blipFill>
         <p:spPr bwMode="auto">
           <a:xfrm>
-            <a:off x="3886200" y="1816100"/>
-            <a:ext cx="4419600" cy="3835400"/>
+            <a:off x="3657600" y="1816100"/>
+            <a:ext cx="4864100" cy="3835400"/>
           </a:xfrm>
           <a:prstGeom prst="rect">
             <a:avLst/>

</xml_diff>